<commit_message>
Presentation and demo details additions
</commit_message>
<xml_diff>
--- a/FourthPresentation.pptx
+++ b/FourthPresentation.pptx
@@ -12767,8 +12767,8 @@
         </p:nvSpPr>
         <p:spPr>
           <a:xfrm>
-            <a:off x="603251" y="1333500"/>
-            <a:ext cx="7854949" cy="1962150"/>
+            <a:off x="603251" y="1327150"/>
+            <a:ext cx="7854949" cy="1600200"/>
           </a:xfrm>
           <a:prstGeom prst="rect">
             <a:avLst/>
@@ -12781,9 +12781,6 @@
           <a:lstStyle/>
           <a:p>
             <a:pPr>
-              <a:lnSpc>
-                <a:spcPct val="150000"/>
-              </a:lnSpc>
               <a:spcAft>
                 <a:spcPts val="1600"/>
               </a:spcAft>
@@ -12803,9 +12800,6 @@
           </a:p>
           <a:p>
             <a:pPr>
-              <a:lnSpc>
-                <a:spcPct val="150000"/>
-              </a:lnSpc>
               <a:spcAft>
                 <a:spcPts val="1600"/>
               </a:spcAft>
@@ -12825,9 +12819,6 @@
           </a:p>
           <a:p>
             <a:pPr>
-              <a:lnSpc>
-                <a:spcPct val="150000"/>
-              </a:lnSpc>
               <a:spcAft>
                 <a:spcPts val="1600"/>
               </a:spcAft>
@@ -12847,9 +12838,6 @@
           </a:p>
           <a:p>
             <a:pPr>
-              <a:lnSpc>
-                <a:spcPct val="150000"/>
-              </a:lnSpc>
               <a:spcAft>
                 <a:spcPts val="1600"/>
               </a:spcAft>
@@ -12957,7 +12945,7 @@
         </p:nvSpPr>
         <p:spPr>
           <a:xfrm>
-            <a:off x="453600" y="975050"/>
+            <a:off x="453600" y="924250"/>
             <a:ext cx="8236800" cy="393600"/>
           </a:xfrm>
           <a:prstGeom prst="rect">
@@ -13002,7 +12990,7 @@
         </p:nvSpPr>
         <p:spPr>
           <a:xfrm>
-            <a:off x="453600" y="3349950"/>
+            <a:off x="453600" y="2880050"/>
             <a:ext cx="8236800" cy="393600"/>
           </a:xfrm>
           <a:prstGeom prst="rect">
@@ -13293,8 +13281,8 @@
         </p:nvSpPr>
         <p:spPr>
           <a:xfrm>
-            <a:off x="644525" y="3727450"/>
-            <a:ext cx="7854949" cy="863600"/>
+            <a:off x="644525" y="3251200"/>
+            <a:ext cx="7854949" cy="1778000"/>
           </a:xfrm>
           <a:prstGeom prst="rect">
             <a:avLst/>
@@ -13557,9 +13545,6 @@
           </a:lstStyle>
           <a:p>
             <a:pPr>
-              <a:lnSpc>
-                <a:spcPct val="150000"/>
-              </a:lnSpc>
               <a:spcAft>
                 <a:spcPts val="1600"/>
               </a:spcAft>
@@ -13597,9 +13582,6 @@
           </a:p>
           <a:p>
             <a:pPr>
-              <a:lnSpc>
-                <a:spcPct val="150000"/>
-              </a:lnSpc>
               <a:spcAft>
                 <a:spcPts val="1600"/>
               </a:spcAft>
@@ -13614,27 +13596,76 @@
                 <a:latin typeface="Roboto Slab Regular" panose="020B0604020202020204" charset="0"/>
                 <a:ea typeface="Roboto Slab Regular" panose="020B0604020202020204" charset="0"/>
               </a:rPr>
-              <a:t> Provides a level of detail that is beyond the built-in tracing feature</a:t>
+              <a:t>Provides a level of detail that is beyond the built-in tracing feature</a:t>
             </a:r>
           </a:p>
           <a:p>
             <a:pPr>
-              <a:lnSpc>
-                <a:spcPct val="150000"/>
-              </a:lnSpc>
               <a:spcAft>
                 <a:spcPts val="1600"/>
               </a:spcAft>
               <a:buFont typeface="Wingdings" panose="05000000000000000000" pitchFamily="2" charset="2"/>
               <a:buChar char="ü"/>
             </a:pPr>
-            <a:endParaRPr lang="en-US" dirty="0">
-              <a:solidFill>
-                <a:schemeClr val="tx1"/>
-              </a:solidFill>
-              <a:latin typeface="Roboto Slab Regular" panose="020B0604020202020204" charset="0"/>
-              <a:ea typeface="Roboto Slab Regular" panose="020B0604020202020204" charset="0"/>
-            </a:endParaRPr>
+            <a:r>
+              <a:rPr lang="en-US" dirty="0">
+                <a:solidFill>
+                  <a:schemeClr val="tx1"/>
+                </a:solidFill>
+                <a:latin typeface="Roboto Slab Regular" panose="020B0604020202020204" charset="0"/>
+                <a:ea typeface="Roboto Slab Regular" panose="020B0604020202020204" charset="0"/>
+              </a:rPr>
+              <a:t>Available as a </a:t>
+            </a:r>
+            <a:r>
+              <a:rPr lang="en-US" dirty="0" err="1">
+                <a:solidFill>
+                  <a:schemeClr val="tx1"/>
+                </a:solidFill>
+                <a:latin typeface="Roboto Slab Regular" panose="020B0604020202020204" charset="0"/>
+                <a:ea typeface="Roboto Slab Regular" panose="020B0604020202020204" charset="0"/>
+              </a:rPr>
+              <a:t>Nuget</a:t>
+            </a:r>
+            <a:r>
+              <a:rPr lang="en-US" dirty="0">
+                <a:solidFill>
+                  <a:schemeClr val="tx1"/>
+                </a:solidFill>
+                <a:latin typeface="Roboto Slab Regular" panose="020B0604020202020204" charset="0"/>
+                <a:ea typeface="Roboto Slab Regular" panose="020B0604020202020204" charset="0"/>
+              </a:rPr>
+              <a:t> Package: </a:t>
+            </a:r>
+            <a:r>
+              <a:rPr lang="en-US" sz="1000" dirty="0">
+                <a:solidFill>
+                  <a:schemeClr val="tx1"/>
+                </a:solidFill>
+                <a:latin typeface="Consolas" panose="020B0609020204030204" pitchFamily="49" charset="0"/>
+                <a:ea typeface="Roboto Slab Regular" panose="020B0604020202020204" charset="0"/>
+              </a:rPr>
+              <a:t>Install-Package Glimpse.MVC5</a:t>
+            </a:r>
+          </a:p>
+          <a:p>
+            <a:pPr>
+              <a:spcAft>
+                <a:spcPts val="1600"/>
+              </a:spcAft>
+              <a:buFont typeface="Wingdings" panose="05000000000000000000" pitchFamily="2" charset="2"/>
+              <a:buChar char="ü"/>
+            </a:pPr>
+            <a:r>
+              <a:rPr lang="en-US" dirty="0">
+                <a:solidFill>
+                  <a:schemeClr val="tx1"/>
+                </a:solidFill>
+                <a:latin typeface="Roboto Slab Regular" panose="020B0604020202020204" charset="0"/>
+                <a:ea typeface="Roboto Slab Regular" panose="020B0604020202020204" charset="0"/>
+              </a:rPr>
+              <a:t>Large catalogue of Glimpse monitoring extensions available</a:t>
+            </a:r>
           </a:p>
         </p:txBody>
       </p:sp>

</xml_diff>

<commit_message>
Number of pages added to the presentation
</commit_message>
<xml_diff>
--- a/FourthPresentation.pptx
+++ b/FourthPresentation.pptx
@@ -16185,12 +16185,6 @@
           <a:lstStyle/>
           <a:p>
             <a:pPr marL="152400" indent="0">
-              <a:lnSpc>
-                <a:spcPct val="200000"/>
-              </a:lnSpc>
-              <a:spcAft>
-                <a:spcPts val="1600"/>
-              </a:spcAft>
               <a:buNone/>
             </a:pPr>
             <a:r>
@@ -16201,7 +16195,22 @@
                 <a:latin typeface="Roboto Slab Regular" panose="020B0604020202020204" charset="0"/>
                 <a:ea typeface="Roboto Slab Regular" panose="020B0604020202020204" charset="0"/>
               </a:rPr>
-              <a:t>Author: Adam Freeman, 2014</a:t>
+              <a:t>Author: Adam Freeman, 2014 </a:t>
+            </a:r>
+          </a:p>
+          <a:p>
+            <a:pPr marL="152400" indent="0">
+              <a:buNone/>
+            </a:pPr>
+            <a:r>
+              <a:rPr lang="en-US" sz="1000" dirty="0">
+                <a:solidFill>
+                  <a:schemeClr val="tx1"/>
+                </a:solidFill>
+                <a:latin typeface="Roboto Slab Regular" panose="020B0604020202020204" charset="0"/>
+                <a:ea typeface="Roboto Slab Regular" panose="020B0604020202020204" charset="0"/>
+              </a:rPr>
+              <a:t>406 pages</a:t>
             </a:r>
           </a:p>
           <a:p>
@@ -16461,7 +16470,7 @@
         </p:blipFill>
         <p:spPr>
           <a:xfrm>
-            <a:off x="5753937" y="4058850"/>
+            <a:off x="5753937" y="3816350"/>
             <a:ext cx="304800" cy="304800"/>
           </a:xfrm>
           <a:prstGeom prst="rect">

</xml_diff>